<commit_message>
Adds new slides to presentation
</commit_message>
<xml_diff>
--- a/doc/Prasentation2.pptx
+++ b/doc/Prasentation2.pptx
@@ -10,7 +10,6 @@
     <p:sldId id="259" r:id="rId4"/>
     <p:sldId id="260" r:id="rId5"/>
     <p:sldId id="262" r:id="rId6"/>
-    <p:sldId id="258" r:id="rId7"/>
   </p:sldIdLst>
   <p:sldSz cx="12192000" cy="6858000"/>
   <p:notesSz cx="6858000" cy="9144000"/>
@@ -3444,7 +3443,39 @@
                   <a:schemeClr val="accent4"/>
                 </a:solidFill>
               </a:rPr>
-              <a:t>An API </a:t>
+              <a:t>A </a:t>
+            </a:r>
+            <a:r>
+              <a:rPr lang="de-CH" dirty="0" err="1">
+                <a:solidFill>
+                  <a:schemeClr val="accent4"/>
+                </a:solidFill>
+              </a:rPr>
+              <a:t>story</a:t>
+            </a:r>
+            <a:r>
+              <a:rPr lang="de-CH" dirty="0">
+                <a:solidFill>
+                  <a:schemeClr val="accent4"/>
+                </a:solidFill>
+              </a:rPr>
+              <a:t> </a:t>
+            </a:r>
+            <a:r>
+              <a:rPr lang="de-CH" dirty="0" err="1">
+                <a:solidFill>
+                  <a:schemeClr val="accent4"/>
+                </a:solidFill>
+              </a:rPr>
+              <a:t>about</a:t>
+            </a:r>
+            <a:r>
+              <a:rPr lang="de-CH" dirty="0">
+                <a:solidFill>
+                  <a:schemeClr val="accent4"/>
+                </a:solidFill>
+              </a:rPr>
+              <a:t> an API </a:t>
             </a:r>
             <a:r>
               <a:rPr lang="de-CH" dirty="0" err="1">
@@ -3492,7 +3523,7 @@
                   <a:schemeClr val="accent4"/>
                 </a:solidFill>
               </a:rPr>
-              <a:t> </a:t>
+              <a:t> was </a:t>
             </a:r>
             <a:r>
               <a:rPr lang="de-CH" dirty="0" err="1">
@@ -3500,7 +3531,7 @@
                   <a:schemeClr val="accent4"/>
                 </a:solidFill>
               </a:rPr>
-              <a:t>worked</a:t>
+              <a:t>fun</a:t>
             </a:r>
             <a:r>
               <a:rPr lang="de-CH" dirty="0">
@@ -3508,7 +3539,7 @@
                   <a:schemeClr val="accent4"/>
                 </a:solidFill>
               </a:rPr>
-              <a:t> - but </a:t>
+              <a:t> in </a:t>
             </a:r>
             <a:r>
               <a:rPr lang="de-CH" dirty="0" err="1">
@@ -3516,7 +3547,39 @@
                   <a:schemeClr val="accent4"/>
                 </a:solidFill>
               </a:rPr>
-              <a:t>nobody</a:t>
+              <a:t>the</a:t>
+            </a:r>
+            <a:r>
+              <a:rPr lang="de-CH" dirty="0">
+                <a:solidFill>
+                  <a:schemeClr val="accent4"/>
+                </a:solidFill>
+              </a:rPr>
+              <a:t> backend – but </a:t>
+            </a:r>
+            <a:r>
+              <a:rPr lang="de-CH" dirty="0" err="1">
+                <a:solidFill>
+                  <a:schemeClr val="accent4"/>
+                </a:solidFill>
+              </a:rPr>
+              <a:t>troublesome</a:t>
+            </a:r>
+            <a:r>
+              <a:rPr lang="de-CH" dirty="0">
+                <a:solidFill>
+                  <a:schemeClr val="accent4"/>
+                </a:solidFill>
+              </a:rPr>
+              <a:t> in </a:t>
+            </a:r>
+            <a:r>
+              <a:rPr lang="de-CH" dirty="0" err="1">
+                <a:solidFill>
+                  <a:schemeClr val="accent4"/>
+                </a:solidFill>
+              </a:rPr>
+              <a:t>the</a:t>
             </a:r>
             <a:r>
               <a:rPr lang="de-CH" dirty="0">
@@ -3532,7 +3595,54 @@
                   <a:schemeClr val="accent4"/>
                 </a:solidFill>
               </a:rPr>
-              <a:t>liked</a:t>
+              <a:t>frontend</a:t>
+            </a:r>
+            <a:endParaRPr lang="de-CH" dirty="0">
+              <a:solidFill>
+                <a:schemeClr val="accent4"/>
+              </a:solidFill>
+            </a:endParaRPr>
+          </a:p>
+          <a:p>
+            <a:r>
+              <a:rPr lang="de-CH" dirty="0" err="1">
+                <a:solidFill>
+                  <a:schemeClr val="accent4"/>
+                </a:solidFill>
+              </a:rPr>
+              <a:t>Directed</a:t>
+            </a:r>
+            <a:r>
+              <a:rPr lang="de-CH" dirty="0">
+                <a:solidFill>
+                  <a:schemeClr val="accent4"/>
+                </a:solidFill>
+              </a:rPr>
+              <a:t> </a:t>
+            </a:r>
+            <a:r>
+              <a:rPr lang="de-CH" dirty="0" err="1">
+                <a:solidFill>
+                  <a:schemeClr val="accent4"/>
+                </a:solidFill>
+              </a:rPr>
+              <a:t>by</a:t>
+            </a:r>
+            <a:r>
+              <a:rPr lang="de-CH" dirty="0">
+                <a:solidFill>
+                  <a:schemeClr val="accent4"/>
+                </a:solidFill>
+              </a:rPr>
+              <a:t> Simon Wächter, Philipp Lüthi, Thibault </a:t>
+            </a:r>
+            <a:r>
+              <a:rPr lang="de-CH" dirty="0" err="1">
+                <a:solidFill>
+                  <a:schemeClr val="accent4"/>
+                </a:solidFill>
+              </a:rPr>
+              <a:t>Gagnaux</a:t>
             </a:r>
             <a:endParaRPr lang="de-CH" dirty="0">
               <a:solidFill>
@@ -4725,106 +4835,14 @@
               <a:t>Unser Backend = API</a:t>
             </a:r>
           </a:p>
-        </p:txBody>
-      </p:sp>
-      <p:sp>
-        <p:nvSpPr>
-          <p:cNvPr id="6" name="Text Placeholder 5">
-            <a:extLst>
-              <a:ext uri="{FF2B5EF4-FFF2-40B4-BE49-F238E27FC236}">
-                <a16:creationId xmlns:a16="http://schemas.microsoft.com/office/drawing/2014/main" id="{B48FAD7F-50DF-6F40-9D6B-1FB2E868C754}"/>
-              </a:ext>
-            </a:extLst>
-          </p:cNvPr>
-          <p:cNvSpPr>
-            <a:spLocks noGrp="1"/>
-          </p:cNvSpPr>
-          <p:nvPr>
-            <p:ph type="body" idx="4294967295"/>
-          </p:nvPr>
-        </p:nvSpPr>
-        <p:spPr>
-          <a:xfrm>
-            <a:off x="0" y="1681163"/>
-            <a:ext cx="5157788" cy="823912"/>
-          </a:xfrm>
-        </p:spPr>
-        <p:txBody>
-          <a:bodyPr/>
-          <a:lstStyle/>
           <a:p>
             <a:r>
               <a:rPr lang="de-CH" dirty="0"/>
-              <a:t>Wieso so einfach?</a:t>
-            </a:r>
-          </a:p>
-        </p:txBody>
-      </p:sp>
-      <p:sp>
-        <p:nvSpPr>
-          <p:cNvPr id="8" name="Text Placeholder 7">
-            <a:extLst>
-              <a:ext uri="{FF2B5EF4-FFF2-40B4-BE49-F238E27FC236}">
-                <a16:creationId xmlns:a16="http://schemas.microsoft.com/office/drawing/2014/main" id="{185FBAAD-A073-F24A-BBA0-069B357F05F5}"/>
-              </a:ext>
-            </a:extLst>
-          </p:cNvPr>
-          <p:cNvSpPr>
-            <a:spLocks noGrp="1"/>
-          </p:cNvSpPr>
-          <p:nvPr>
-            <p:ph type="body" sz="quarter" idx="4294967295"/>
-          </p:nvPr>
-        </p:nvSpPr>
-        <p:spPr>
-          <a:xfrm>
-            <a:off x="7008813" y="1681163"/>
-            <a:ext cx="5183187" cy="823912"/>
-          </a:xfrm>
-        </p:spPr>
-        <p:txBody>
-          <a:bodyPr>
-            <a:normAutofit lnSpcReduction="10000"/>
-          </a:bodyPr>
-          <a:lstStyle/>
-          <a:p>
-            <a:r>
-              <a:rPr lang="de-CH" dirty="0"/>
-              <a:t>Was macht die Integration schwierig?</a:t>
-            </a:r>
-          </a:p>
-        </p:txBody>
-      </p:sp>
-      <p:sp>
-        <p:nvSpPr>
-          <p:cNvPr id="9" name="Content Placeholder 8">
-            <a:extLst>
-              <a:ext uri="{FF2B5EF4-FFF2-40B4-BE49-F238E27FC236}">
-                <a16:creationId xmlns:a16="http://schemas.microsoft.com/office/drawing/2014/main" id="{13BCF347-4318-1144-A9B2-B8FDEB80B616}"/>
-              </a:ext>
-            </a:extLst>
-          </p:cNvPr>
-          <p:cNvSpPr>
-            <a:spLocks noGrp="1"/>
-          </p:cNvSpPr>
-          <p:nvPr>
-            <p:ph sz="quarter" idx="4294967295"/>
-          </p:nvPr>
-        </p:nvSpPr>
-        <p:spPr>
-          <a:xfrm>
-            <a:off x="7008813" y="2505075"/>
-            <a:ext cx="5183187" cy="3684588"/>
-          </a:xfrm>
-        </p:spPr>
-        <p:txBody>
-          <a:bodyPr/>
-          <a:lstStyle/>
-          <a:p>
-            <a:r>
-              <a:rPr lang="de-CH" dirty="0"/>
-              <a:t>Unterschiedliche Auslegung des APIs -&gt; Claim</a:t>
-            </a:r>
+              <a:t>Neues Frontend = API</a:t>
+            </a:r>
+          </a:p>
+          <a:p>
+            <a:endParaRPr lang="de-CH" dirty="0"/>
           </a:p>
         </p:txBody>
       </p:sp>
@@ -4923,109 +4941,49 @@
           <a:p>
             <a:r>
               <a:rPr lang="de-CH" dirty="0"/>
-              <a:t>Unser Backend = API</a:t>
-            </a:r>
-          </a:p>
-        </p:txBody>
-      </p:sp>
-      <p:sp>
-        <p:nvSpPr>
-          <p:cNvPr id="6" name="Text Placeholder 5">
-            <a:extLst>
-              <a:ext uri="{FF2B5EF4-FFF2-40B4-BE49-F238E27FC236}">
-                <a16:creationId xmlns:a16="http://schemas.microsoft.com/office/drawing/2014/main" id="{B48FAD7F-50DF-6F40-9D6B-1FB2E868C754}"/>
-              </a:ext>
-            </a:extLst>
-          </p:cNvPr>
-          <p:cNvSpPr>
-            <a:spLocks noGrp="1"/>
-          </p:cNvSpPr>
-          <p:nvPr>
-            <p:ph type="body" idx="4294967295"/>
-          </p:nvPr>
-        </p:nvSpPr>
-        <p:spPr>
-          <a:xfrm>
-            <a:off x="0" y="1681163"/>
-            <a:ext cx="5157788" cy="823912"/>
-          </a:xfrm>
-        </p:spPr>
-        <p:txBody>
-          <a:bodyPr/>
-          <a:lstStyle/>
-          <a:p>
+              <a:t>Interpretation des Claims war nicht eindeutig</a:t>
+            </a:r>
+          </a:p>
+          <a:p>
+            <a:r>
+              <a:rPr lang="de-CH" dirty="0" err="1"/>
+              <a:t>Application</a:t>
+            </a:r>
             <a:r>
               <a:rPr lang="de-CH" dirty="0"/>
-              <a:t>Wieso so einfach?</a:t>
-            </a:r>
-          </a:p>
-        </p:txBody>
-      </p:sp>
-      <p:sp>
-        <p:nvSpPr>
-          <p:cNvPr id="8" name="Text Placeholder 7">
-            <a:extLst>
-              <a:ext uri="{FF2B5EF4-FFF2-40B4-BE49-F238E27FC236}">
-                <a16:creationId xmlns:a16="http://schemas.microsoft.com/office/drawing/2014/main" id="{185FBAAD-A073-F24A-BBA0-069B357F05F5}"/>
-              </a:ext>
-            </a:extLst>
-          </p:cNvPr>
-          <p:cNvSpPr>
-            <a:spLocks noGrp="1"/>
-          </p:cNvSpPr>
-          <p:nvPr>
-            <p:ph type="body" sz="quarter" idx="4294967295"/>
-          </p:nvPr>
-        </p:nvSpPr>
-        <p:spPr>
-          <a:xfrm>
-            <a:off x="7008813" y="1681163"/>
-            <a:ext cx="5183187" cy="823912"/>
-          </a:xfrm>
-        </p:spPr>
-        <p:txBody>
-          <a:bodyPr>
-            <a:normAutofit lnSpcReduction="10000"/>
-          </a:bodyPr>
-          <a:lstStyle/>
-          <a:p>
+              <a:t>/</a:t>
+            </a:r>
+            <a:r>
+              <a:rPr lang="de-CH" dirty="0" err="1"/>
+              <a:t>json</a:t>
+            </a:r>
             <a:r>
               <a:rPr lang="de-CH" dirty="0"/>
-              <a:t>Was macht die Integration schwierig?</a:t>
-            </a:r>
-          </a:p>
-        </p:txBody>
-      </p:sp>
-      <p:sp>
-        <p:nvSpPr>
-          <p:cNvPr id="9" name="Content Placeholder 8">
-            <a:extLst>
-              <a:ext uri="{FF2B5EF4-FFF2-40B4-BE49-F238E27FC236}">
-                <a16:creationId xmlns:a16="http://schemas.microsoft.com/office/drawing/2014/main" id="{13BCF347-4318-1144-A9B2-B8FDEB80B616}"/>
-              </a:ext>
-            </a:extLst>
-          </p:cNvPr>
-          <p:cNvSpPr>
-            <a:spLocks noGrp="1"/>
-          </p:cNvSpPr>
-          <p:nvPr>
-            <p:ph sz="quarter" idx="4294967295"/>
-          </p:nvPr>
-        </p:nvSpPr>
-        <p:spPr>
-          <a:xfrm>
-            <a:off x="7008813" y="2505075"/>
-            <a:ext cx="5183187" cy="3684588"/>
-          </a:xfrm>
-        </p:spPr>
-        <p:txBody>
-          <a:bodyPr/>
-          <a:lstStyle/>
-          <a:p>
+              <a:t> im Header beim Erstellen eines </a:t>
+            </a:r>
+            <a:r>
+              <a:rPr lang="de-CH" dirty="0" err="1"/>
+              <a:t>Employees</a:t>
+            </a:r>
+            <a:endParaRPr lang="de-CH" dirty="0"/>
+          </a:p>
+          <a:p>
+            <a:r>
+              <a:rPr lang="de-CH" dirty="0" err="1"/>
+              <a:t>Dependencies</a:t>
+            </a:r>
             <a:r>
               <a:rPr lang="de-CH" dirty="0"/>
-              <a:t>Unterschiedliche Auslegung des APIs -&gt; Claim</a:t>
-            </a:r>
+              <a:t> unverändert bei </a:t>
+            </a:r>
+            <a:r>
+              <a:rPr lang="de-CH" dirty="0" err="1"/>
+              <a:t>Uebergabe</a:t>
+            </a:r>
+            <a:endParaRPr lang="de-CH" dirty="0"/>
+          </a:p>
+          <a:p>
+            <a:endParaRPr lang="de-CH" dirty="0"/>
           </a:p>
         </p:txBody>
       </p:sp>
@@ -5033,271 +4991,6 @@
     <p:extLst>
       <p:ext uri="{BB962C8B-B14F-4D97-AF65-F5344CB8AC3E}">
         <p14:creationId xmlns:p14="http://schemas.microsoft.com/office/powerpoint/2010/main" val="826342024"/>
-      </p:ext>
-    </p:extLst>
-  </p:cSld>
-  <p:clrMapOvr>
-    <a:masterClrMapping/>
-  </p:clrMapOvr>
-</p:sld>
-</file>
-
-<file path=ppt/slides/slide6.xml><?xml version="1.0" encoding="utf-8"?>
-<p:sld xmlns:a="http://schemas.openxmlformats.org/drawingml/2006/main" xmlns:r="http://schemas.openxmlformats.org/officeDocument/2006/relationships" xmlns:p="http://schemas.openxmlformats.org/presentationml/2006/main" show="0">
-  <p:cSld>
-    <p:spTree>
-      <p:nvGrpSpPr>
-        <p:cNvPr id="1" name=""/>
-        <p:cNvGrpSpPr/>
-        <p:nvPr/>
-      </p:nvGrpSpPr>
-      <p:grpSpPr>
-        <a:xfrm>
-          <a:off x="0" y="0"/>
-          <a:ext cx="0" cy="0"/>
-          <a:chOff x="0" y="0"/>
-          <a:chExt cx="0" cy="0"/>
-        </a:xfrm>
-      </p:grpSpPr>
-      <p:sp>
-        <p:nvSpPr>
-          <p:cNvPr id="6" name="Rounded Rectangle 5">
-            <a:extLst>
-              <a:ext uri="{FF2B5EF4-FFF2-40B4-BE49-F238E27FC236}">
-                <a16:creationId xmlns:a16="http://schemas.microsoft.com/office/drawing/2014/main" id="{915F4597-0A41-5F43-AC66-3310C53C8270}"/>
-              </a:ext>
-            </a:extLst>
-          </p:cNvPr>
-          <p:cNvSpPr/>
-          <p:nvPr/>
-        </p:nvSpPr>
-        <p:spPr>
-          <a:xfrm>
-            <a:off x="3228975" y="1690688"/>
-            <a:ext cx="5353050" cy="914400"/>
-          </a:xfrm>
-          <a:prstGeom prst="roundRect">
-            <a:avLst/>
-          </a:prstGeom>
-          <a:noFill/>
-          <a:ln>
-            <a:solidFill>
-              <a:schemeClr val="accent2"/>
-            </a:solidFill>
-          </a:ln>
-        </p:spPr>
-        <p:style>
-          <a:lnRef idx="2">
-            <a:schemeClr val="accent1">
-              <a:shade val="50000"/>
-            </a:schemeClr>
-          </a:lnRef>
-          <a:fillRef idx="1">
-            <a:schemeClr val="accent1"/>
-          </a:fillRef>
-          <a:effectRef idx="0">
-            <a:schemeClr val="accent1"/>
-          </a:effectRef>
-          <a:fontRef idx="minor">
-            <a:schemeClr val="lt1"/>
-          </a:fontRef>
-        </p:style>
-        <p:txBody>
-          <a:bodyPr rtlCol="0" anchor="ctr"/>
-          <a:lstStyle/>
-          <a:p>
-            <a:pPr algn="ctr"/>
-            <a:r>
-              <a:rPr lang="de-CH" sz="3200" dirty="0" err="1">
-                <a:solidFill>
-                  <a:schemeClr val="accent2"/>
-                </a:solidFill>
-              </a:rPr>
-              <a:t>Vue</a:t>
-            </a:r>
-            <a:endParaRPr lang="de-CH" sz="3200" dirty="0">
-              <a:solidFill>
-                <a:schemeClr val="accent2"/>
-              </a:solidFill>
-            </a:endParaRPr>
-          </a:p>
-        </p:txBody>
-      </p:sp>
-      <p:sp>
-        <p:nvSpPr>
-          <p:cNvPr id="2" name="Title 1">
-            <a:extLst>
-              <a:ext uri="{FF2B5EF4-FFF2-40B4-BE49-F238E27FC236}">
-                <a16:creationId xmlns:a16="http://schemas.microsoft.com/office/drawing/2014/main" id="{CDAA8888-FA5F-4340-9AD1-3DB6C8D30B4E}"/>
-              </a:ext>
-            </a:extLst>
-          </p:cNvPr>
-          <p:cNvSpPr>
-            <a:spLocks noGrp="1"/>
-          </p:cNvSpPr>
-          <p:nvPr>
-            <p:ph type="title"/>
-          </p:nvPr>
-        </p:nvSpPr>
-        <p:spPr/>
-        <p:txBody>
-          <a:bodyPr/>
-          <a:lstStyle/>
-          <a:p>
-            <a:r>
-              <a:rPr lang="de-CH" b="1" dirty="0">
-                <a:solidFill>
-                  <a:schemeClr val="accent4"/>
-                </a:solidFill>
-              </a:rPr>
-              <a:t>New Technology Stack</a:t>
-            </a:r>
-          </a:p>
-        </p:txBody>
-      </p:sp>
-      <p:sp>
-        <p:nvSpPr>
-          <p:cNvPr id="7" name="Rounded Rectangle 6">
-            <a:extLst>
-              <a:ext uri="{FF2B5EF4-FFF2-40B4-BE49-F238E27FC236}">
-                <a16:creationId xmlns:a16="http://schemas.microsoft.com/office/drawing/2014/main" id="{40852B07-52AE-A249-A7D6-CF9DFBC44CA8}"/>
-              </a:ext>
-            </a:extLst>
-          </p:cNvPr>
-          <p:cNvSpPr/>
-          <p:nvPr/>
-        </p:nvSpPr>
-        <p:spPr>
-          <a:xfrm>
-            <a:off x="3228975" y="3338513"/>
-            <a:ext cx="5353050" cy="914400"/>
-          </a:xfrm>
-          <a:prstGeom prst="roundRect">
-            <a:avLst/>
-          </a:prstGeom>
-          <a:noFill/>
-          <a:ln>
-            <a:solidFill>
-              <a:schemeClr val="accent2"/>
-            </a:solidFill>
-          </a:ln>
-        </p:spPr>
-        <p:style>
-          <a:lnRef idx="2">
-            <a:schemeClr val="accent1">
-              <a:shade val="50000"/>
-            </a:schemeClr>
-          </a:lnRef>
-          <a:fillRef idx="1">
-            <a:schemeClr val="accent1"/>
-          </a:fillRef>
-          <a:effectRef idx="0">
-            <a:schemeClr val="accent1"/>
-          </a:effectRef>
-          <a:fontRef idx="minor">
-            <a:schemeClr val="lt1"/>
-          </a:fontRef>
-        </p:style>
-        <p:txBody>
-          <a:bodyPr rtlCol="0" anchor="ctr"/>
-          <a:lstStyle/>
-          <a:p>
-            <a:pPr algn="ctr"/>
-            <a:r>
-              <a:rPr lang="de-CH" sz="3200" dirty="0">
-                <a:solidFill>
-                  <a:schemeClr val="accent2"/>
-                </a:solidFill>
-              </a:rPr>
-              <a:t>Spring Boot</a:t>
-            </a:r>
-          </a:p>
-        </p:txBody>
-      </p:sp>
-      <p:sp>
-        <p:nvSpPr>
-          <p:cNvPr id="8" name="Rounded Rectangle 7">
-            <a:extLst>
-              <a:ext uri="{FF2B5EF4-FFF2-40B4-BE49-F238E27FC236}">
-                <a16:creationId xmlns:a16="http://schemas.microsoft.com/office/drawing/2014/main" id="{A410CDE5-08BB-4746-B689-A23A08DFF689}"/>
-              </a:ext>
-            </a:extLst>
-          </p:cNvPr>
-          <p:cNvSpPr/>
-          <p:nvPr/>
-        </p:nvSpPr>
-        <p:spPr>
-          <a:xfrm>
-            <a:off x="3228975" y="4986338"/>
-            <a:ext cx="5353050" cy="914400"/>
-          </a:xfrm>
-          <a:prstGeom prst="roundRect">
-            <a:avLst/>
-          </a:prstGeom>
-          <a:noFill/>
-          <a:ln>
-            <a:solidFill>
-              <a:schemeClr val="accent2"/>
-            </a:solidFill>
-          </a:ln>
-        </p:spPr>
-        <p:style>
-          <a:lnRef idx="2">
-            <a:schemeClr val="accent1">
-              <a:shade val="50000"/>
-            </a:schemeClr>
-          </a:lnRef>
-          <a:fillRef idx="1">
-            <a:schemeClr val="accent1"/>
-          </a:fillRef>
-          <a:effectRef idx="0">
-            <a:schemeClr val="accent1"/>
-          </a:effectRef>
-          <a:fontRef idx="minor">
-            <a:schemeClr val="lt1"/>
-          </a:fontRef>
-        </p:style>
-        <p:txBody>
-          <a:bodyPr rtlCol="0" anchor="ctr"/>
-          <a:lstStyle/>
-          <a:p>
-            <a:pPr algn="ctr"/>
-            <a:r>
-              <a:rPr lang="de-CH" sz="3200" dirty="0" err="1">
-                <a:solidFill>
-                  <a:schemeClr val="accent2"/>
-                </a:solidFill>
-              </a:rPr>
-              <a:t>Jooq</a:t>
-            </a:r>
-            <a:r>
-              <a:rPr lang="de-CH" sz="3200" dirty="0">
-                <a:solidFill>
-                  <a:schemeClr val="accent2"/>
-                </a:solidFill>
-              </a:rPr>
-              <a:t> + </a:t>
-            </a:r>
-            <a:r>
-              <a:rPr lang="de-CH" sz="3200" dirty="0" err="1">
-                <a:solidFill>
-                  <a:schemeClr val="accent2"/>
-                </a:solidFill>
-              </a:rPr>
-              <a:t>Postgresql</a:t>
-            </a:r>
-            <a:endParaRPr lang="de-CH" sz="3200" dirty="0">
-              <a:solidFill>
-                <a:schemeClr val="accent2"/>
-              </a:solidFill>
-            </a:endParaRPr>
-          </a:p>
-        </p:txBody>
-      </p:sp>
-    </p:spTree>
-    <p:extLst>
-      <p:ext uri="{BB962C8B-B14F-4D97-AF65-F5344CB8AC3E}">
-        <p14:creationId xmlns:p14="http://schemas.microsoft.com/office/powerpoint/2010/main" val="4112952607"/>
       </p:ext>
     </p:extLst>
   </p:cSld>

</xml_diff>

<commit_message>
Adds more infos to presentation
</commit_message>
<xml_diff>
--- a/doc/Prasentation2.pptx
+++ b/doc/Prasentation2.pptx
@@ -10,6 +10,7 @@
     <p:sldId id="259" r:id="rId4"/>
     <p:sldId id="260" r:id="rId5"/>
     <p:sldId id="262" r:id="rId6"/>
+    <p:sldId id="263" r:id="rId7"/>
   </p:sldIdLst>
   <p:sldSz cx="12192000" cy="6858000"/>
   <p:notesSz cx="6858000" cy="9144000"/>
@@ -3411,8 +3412,37 @@
                   <a:schemeClr val="accent4"/>
                 </a:solidFill>
               </a:rPr>
-              <a:t>Technology Integration</a:t>
-            </a:r>
+              <a:t>Technology Integration </a:t>
+            </a:r>
+            <a:r>
+              <a:rPr lang="de-CH" b="1" dirty="0" err="1">
+                <a:solidFill>
+                  <a:schemeClr val="accent4"/>
+                </a:solidFill>
+              </a:rPr>
+              <a:t>of</a:t>
+            </a:r>
+            <a:r>
+              <a:rPr lang="de-CH" b="1" dirty="0">
+                <a:solidFill>
+                  <a:schemeClr val="accent4"/>
+                </a:solidFill>
+              </a:rPr>
+              <a:t> Group 5 </a:t>
+            </a:r>
+            <a:r>
+              <a:rPr lang="de-CH" b="1" dirty="0" err="1">
+                <a:solidFill>
+                  <a:schemeClr val="accent4"/>
+                </a:solidFill>
+              </a:rPr>
+              <a:t>and</a:t>
+            </a:r>
+            <a:endParaRPr lang="de-CH" b="1" dirty="0">
+              <a:solidFill>
+                <a:schemeClr val="accent4"/>
+              </a:solidFill>
+            </a:endParaRPr>
           </a:p>
         </p:txBody>
       </p:sp>
@@ -4947,25 +4977,44 @@
           <a:p>
             <a:r>
               <a:rPr lang="de-CH" dirty="0" err="1"/>
-              <a:t>Application</a:t>
+              <a:t>Is</a:t>
             </a:r>
             <a:r>
               <a:rPr lang="de-CH" dirty="0"/>
-              <a:t>/</a:t>
+              <a:t> </a:t>
             </a:r>
             <a:r>
               <a:rPr lang="de-CH" dirty="0" err="1"/>
-              <a:t>json</a:t>
+              <a:t>Active</a:t>
             </a:r>
             <a:r>
               <a:rPr lang="de-CH" dirty="0"/>
-              <a:t> im Header beim Erstellen eines </a:t>
+              <a:t> </a:t>
             </a:r>
             <a:r>
               <a:rPr lang="de-CH" dirty="0" err="1"/>
-              <a:t>Employees</a:t>
-            </a:r>
-            <a:endParaRPr lang="de-CH" dirty="0"/>
+              <a:t>Flag</a:t>
+            </a:r>
+            <a:r>
+              <a:rPr lang="de-CH" dirty="0"/>
+              <a:t> – Default </a:t>
+            </a:r>
+            <a:r>
+              <a:rPr lang="de-CH" dirty="0" err="1"/>
+              <a:t>false</a:t>
+            </a:r>
+            <a:r>
+              <a:rPr lang="de-CH" dirty="0"/>
+              <a:t> oder </a:t>
+            </a:r>
+            <a:r>
+              <a:rPr lang="de-CH" dirty="0" err="1"/>
+              <a:t>true</a:t>
+            </a:r>
+            <a:r>
+              <a:rPr lang="de-CH" dirty="0"/>
+              <a:t>?</a:t>
+            </a:r>
           </a:p>
           <a:p>
             <a:r>
@@ -4974,12 +5023,13 @@
             </a:r>
             <a:r>
               <a:rPr lang="de-CH" dirty="0"/>
-              <a:t> unverändert bei </a:t>
-            </a:r>
-            <a:r>
-              <a:rPr lang="de-CH" dirty="0" err="1"/>
-              <a:t>Uebergabe</a:t>
-            </a:r>
+              <a:t> unverändert bei Übergabe</a:t>
+            </a:r>
+          </a:p>
+          <a:p>
+            <a:pPr marL="0" indent="0">
+              <a:buNone/>
+            </a:pPr>
             <a:endParaRPr lang="de-CH" dirty="0"/>
           </a:p>
           <a:p>
@@ -4991,6 +5041,177 @@
     <p:extLst>
       <p:ext uri="{BB962C8B-B14F-4D97-AF65-F5344CB8AC3E}">
         <p14:creationId xmlns:p14="http://schemas.microsoft.com/office/powerpoint/2010/main" val="826342024"/>
+      </p:ext>
+    </p:extLst>
+  </p:cSld>
+  <p:clrMapOvr>
+    <a:masterClrMapping/>
+  </p:clrMapOvr>
+</p:sld>
+</file>
+
+<file path=ppt/slides/slide6.xml><?xml version="1.0" encoding="utf-8"?>
+<p:sld xmlns:a="http://schemas.openxmlformats.org/drawingml/2006/main" xmlns:r="http://schemas.openxmlformats.org/officeDocument/2006/relationships" xmlns:p="http://schemas.openxmlformats.org/presentationml/2006/main">
+  <p:cSld>
+    <p:spTree>
+      <p:nvGrpSpPr>
+        <p:cNvPr id="1" name=""/>
+        <p:cNvGrpSpPr/>
+        <p:nvPr/>
+      </p:nvGrpSpPr>
+      <p:grpSpPr>
+        <a:xfrm>
+          <a:off x="0" y="0"/>
+          <a:ext cx="0" cy="0"/>
+          <a:chOff x="0" y="0"/>
+          <a:chExt cx="0" cy="0"/>
+        </a:xfrm>
+      </p:grpSpPr>
+      <p:sp>
+        <p:nvSpPr>
+          <p:cNvPr id="2" name="Title 1">
+            <a:extLst>
+              <a:ext uri="{FF2B5EF4-FFF2-40B4-BE49-F238E27FC236}">
+                <a16:creationId xmlns:a16="http://schemas.microsoft.com/office/drawing/2014/main" id="{F8152289-08FD-FE42-94F7-90486A3AE359}"/>
+              </a:ext>
+            </a:extLst>
+          </p:cNvPr>
+          <p:cNvSpPr>
+            <a:spLocks noGrp="1"/>
+          </p:cNvSpPr>
+          <p:nvPr>
+            <p:ph type="title"/>
+          </p:nvPr>
+        </p:nvSpPr>
+        <p:spPr/>
+        <p:txBody>
+          <a:bodyPr>
+            <a:normAutofit/>
+          </a:bodyPr>
+          <a:lstStyle/>
+          <a:p>
+            <a:r>
+              <a:rPr lang="de-CH" sz="2800" b="1" dirty="0" err="1">
+                <a:solidFill>
+                  <a:schemeClr val="accent4"/>
+                </a:solidFill>
+              </a:rPr>
+              <a:t>Lessons</a:t>
+            </a:r>
+            <a:r>
+              <a:rPr lang="de-CH" sz="2800" b="1" dirty="0">
+                <a:solidFill>
+                  <a:schemeClr val="accent4"/>
+                </a:solidFill>
+              </a:rPr>
+              <a:t> </a:t>
+            </a:r>
+            <a:r>
+              <a:rPr lang="de-CH" sz="2800" b="1" dirty="0" err="1">
+                <a:solidFill>
+                  <a:schemeClr val="accent4"/>
+                </a:solidFill>
+              </a:rPr>
+              <a:t>Learned</a:t>
+            </a:r>
+            <a:endParaRPr lang="de-CH" sz="2800" b="1" dirty="0">
+              <a:solidFill>
+                <a:schemeClr val="accent4"/>
+              </a:solidFill>
+            </a:endParaRPr>
+          </a:p>
+        </p:txBody>
+      </p:sp>
+      <p:sp>
+        <p:nvSpPr>
+          <p:cNvPr id="7" name="Content Placeholder 6">
+            <a:extLst>
+              <a:ext uri="{FF2B5EF4-FFF2-40B4-BE49-F238E27FC236}">
+                <a16:creationId xmlns:a16="http://schemas.microsoft.com/office/drawing/2014/main" id="{55A1193B-657D-B141-8A5F-B40B714148CE}"/>
+              </a:ext>
+            </a:extLst>
+          </p:cNvPr>
+          <p:cNvSpPr>
+            <a:spLocks noGrp="1"/>
+          </p:cNvSpPr>
+          <p:nvPr>
+            <p:ph idx="1"/>
+          </p:nvPr>
+        </p:nvSpPr>
+        <p:spPr/>
+        <p:txBody>
+          <a:bodyPr/>
+          <a:lstStyle/>
+          <a:p>
+            <a:r>
+              <a:rPr lang="de-CH" dirty="0" err="1"/>
+              <a:t>Jooq</a:t>
+            </a:r>
+            <a:r>
+              <a:rPr lang="de-CH" dirty="0"/>
+              <a:t>: gerne wieder</a:t>
+            </a:r>
+          </a:p>
+          <a:p>
+            <a:r>
+              <a:rPr lang="de-CH" dirty="0" err="1"/>
+              <a:t>Preact</a:t>
+            </a:r>
+            <a:r>
+              <a:rPr lang="de-CH" dirty="0"/>
+              <a:t>: </a:t>
+            </a:r>
+            <a:r>
+              <a:rPr lang="de-CH" dirty="0" err="1"/>
+              <a:t>Flashy</a:t>
+            </a:r>
+            <a:r>
+              <a:rPr lang="de-CH" dirty="0"/>
+              <a:t> </a:t>
+            </a:r>
+            <a:r>
+              <a:rPr lang="de-CH" dirty="0" err="1"/>
+              <a:t>and</a:t>
+            </a:r>
+            <a:r>
+              <a:rPr lang="de-CH" dirty="0"/>
+              <a:t> </a:t>
+            </a:r>
+            <a:r>
+              <a:rPr lang="de-CH" dirty="0" err="1"/>
+              <a:t>fancy</a:t>
+            </a:r>
+            <a:r>
+              <a:rPr lang="de-CH" dirty="0"/>
+              <a:t>, Support schwach</a:t>
+            </a:r>
+          </a:p>
+          <a:p>
+            <a:r>
+              <a:rPr lang="de-CH" dirty="0"/>
+              <a:t>API-Design </a:t>
+            </a:r>
+            <a:r>
+              <a:rPr lang="de-CH" dirty="0" err="1"/>
+              <a:t>first</a:t>
+            </a:r>
+            <a:r>
+              <a:rPr lang="de-CH" dirty="0"/>
+              <a:t>: angenehm im Backend, mühsam im Frontend</a:t>
+            </a:r>
+          </a:p>
+          <a:p>
+            <a:pPr marL="0" indent="0">
+              <a:buNone/>
+            </a:pPr>
+            <a:endParaRPr lang="de-CH" dirty="0"/>
+          </a:p>
+        </p:txBody>
+      </p:sp>
+    </p:spTree>
+    <p:extLst>
+      <p:ext uri="{BB962C8B-B14F-4D97-AF65-F5344CB8AC3E}">
+        <p14:creationId xmlns:p14="http://schemas.microsoft.com/office/powerpoint/2010/main" val="3269462816"/>
       </p:ext>
     </p:extLst>
   </p:cSld>

</xml_diff>